<commit_message>
kleine Änderungen an Abb 1
</commit_message>
<xml_diff>
--- a/Grafiken/Loesungskonzepte.pptx
+++ b/Grafiken/Loesungskonzepte.pptx
@@ -12178,45 +12178,6 @@
       </p:grpSp>
       <p:cxnSp>
         <p:nvCxnSpPr>
-          <p:cNvPr id="109" name="Gerade Verbindung mit Pfeil 11"/>
-          <p:cNvCxnSpPr>
-            <a:stCxn id="4" idx="2"/>
-            <a:endCxn id="103" idx="3"/>
-          </p:cNvCxnSpPr>
-          <p:nvPr/>
-        </p:nvCxnSpPr>
-        <p:spPr>
-          <a:xfrm rot="5400000">
-            <a:off x="7560967" y="921033"/>
-            <a:ext cx="310309" cy="451856"/>
-          </a:xfrm>
-          <a:prstGeom prst="bentConnector2">
-            <a:avLst/>
-          </a:prstGeom>
-          <a:ln>
-            <a:solidFill>
-              <a:schemeClr val="tx1"/>
-            </a:solidFill>
-            <a:tailEnd type="triangle"/>
-          </a:ln>
-        </p:spPr>
-        <p:style>
-          <a:lnRef idx="1">
-            <a:schemeClr val="accent1"/>
-          </a:lnRef>
-          <a:fillRef idx="0">
-            <a:schemeClr val="accent1"/>
-          </a:fillRef>
-          <a:effectRef idx="0">
-            <a:schemeClr val="accent1"/>
-          </a:effectRef>
-          <a:fontRef idx="minor">
-            <a:schemeClr val="tx1"/>
-          </a:fontRef>
-        </p:style>
-      </p:cxnSp>
-      <p:cxnSp>
-        <p:nvCxnSpPr>
           <p:cNvPr id="113" name="Gerade Verbindung mit Pfeil 11"/>
           <p:cNvCxnSpPr/>
           <p:nvPr/>
@@ -12788,6 +12749,45 @@
           </p:txBody>
         </p:sp>
       </p:grpSp>
+      <p:cxnSp>
+        <p:nvCxnSpPr>
+          <p:cNvPr id="109" name="Gerade Verbindung mit Pfeil 11"/>
+          <p:cNvCxnSpPr>
+            <a:stCxn id="4" idx="2"/>
+            <a:endCxn id="103" idx="3"/>
+          </p:cNvCxnSpPr>
+          <p:nvPr/>
+        </p:nvCxnSpPr>
+        <p:spPr>
+          <a:xfrm rot="5400000">
+            <a:off x="7560967" y="921033"/>
+            <a:ext cx="310309" cy="451856"/>
+          </a:xfrm>
+          <a:prstGeom prst="bentConnector2">
+            <a:avLst/>
+          </a:prstGeom>
+          <a:ln>
+            <a:solidFill>
+              <a:srgbClr val="00B050"/>
+            </a:solidFill>
+            <a:tailEnd type="triangle"/>
+          </a:ln>
+        </p:spPr>
+        <p:style>
+          <a:lnRef idx="1">
+            <a:schemeClr val="accent1"/>
+          </a:lnRef>
+          <a:fillRef idx="0">
+            <a:schemeClr val="accent1"/>
+          </a:fillRef>
+          <a:effectRef idx="0">
+            <a:schemeClr val="accent1"/>
+          </a:effectRef>
+          <a:fontRef idx="minor">
+            <a:schemeClr val="tx1"/>
+          </a:fontRef>
+        </p:style>
+      </p:cxnSp>
     </p:spTree>
     <p:extLst>
       <p:ext uri="{BB962C8B-B14F-4D97-AF65-F5344CB8AC3E}">

</xml_diff>

<commit_message>
Vorab-Finale Version von Tobias und Luise
</commit_message>
<xml_diff>
--- a/Grafiken/Loesungskonzepte.pptx
+++ b/Grafiken/Loesungskonzepte.pptx
@@ -311,7 +311,7 @@
           <a:p>
             <a:fld id="{62A7EEA7-7CF7-4A21-92C8-3CFB69AD4175}" type="datetimeFigureOut">
               <a:rPr lang="de-DE" smtClean="0"/>
-              <a:t>03.03.2017</a:t>
+              <a:t>05.03.2017</a:t>
             </a:fld>
             <a:endParaRPr lang="de-DE"/>
           </a:p>
@@ -481,7 +481,7 @@
           <a:p>
             <a:fld id="{62A7EEA7-7CF7-4A21-92C8-3CFB69AD4175}" type="datetimeFigureOut">
               <a:rPr lang="de-DE" smtClean="0"/>
-              <a:t>03.03.2017</a:t>
+              <a:t>05.03.2017</a:t>
             </a:fld>
             <a:endParaRPr lang="de-DE"/>
           </a:p>
@@ -661,7 +661,7 @@
           <a:p>
             <a:fld id="{62A7EEA7-7CF7-4A21-92C8-3CFB69AD4175}" type="datetimeFigureOut">
               <a:rPr lang="de-DE" smtClean="0"/>
-              <a:t>03.03.2017</a:t>
+              <a:t>05.03.2017</a:t>
             </a:fld>
             <a:endParaRPr lang="de-DE"/>
           </a:p>
@@ -831,7 +831,7 @@
           <a:p>
             <a:fld id="{62A7EEA7-7CF7-4A21-92C8-3CFB69AD4175}" type="datetimeFigureOut">
               <a:rPr lang="de-DE" smtClean="0"/>
-              <a:t>03.03.2017</a:t>
+              <a:t>05.03.2017</a:t>
             </a:fld>
             <a:endParaRPr lang="de-DE"/>
           </a:p>
@@ -1077,7 +1077,7 @@
           <a:p>
             <a:fld id="{62A7EEA7-7CF7-4A21-92C8-3CFB69AD4175}" type="datetimeFigureOut">
               <a:rPr lang="de-DE" smtClean="0"/>
-              <a:t>03.03.2017</a:t>
+              <a:t>05.03.2017</a:t>
             </a:fld>
             <a:endParaRPr lang="de-DE"/>
           </a:p>
@@ -1365,7 +1365,7 @@
           <a:p>
             <a:fld id="{62A7EEA7-7CF7-4A21-92C8-3CFB69AD4175}" type="datetimeFigureOut">
               <a:rPr lang="de-DE" smtClean="0"/>
-              <a:t>03.03.2017</a:t>
+              <a:t>05.03.2017</a:t>
             </a:fld>
             <a:endParaRPr lang="de-DE"/>
           </a:p>
@@ -1787,7 +1787,7 @@
           <a:p>
             <a:fld id="{62A7EEA7-7CF7-4A21-92C8-3CFB69AD4175}" type="datetimeFigureOut">
               <a:rPr lang="de-DE" smtClean="0"/>
-              <a:t>03.03.2017</a:t>
+              <a:t>05.03.2017</a:t>
             </a:fld>
             <a:endParaRPr lang="de-DE"/>
           </a:p>
@@ -1905,7 +1905,7 @@
           <a:p>
             <a:fld id="{62A7EEA7-7CF7-4A21-92C8-3CFB69AD4175}" type="datetimeFigureOut">
               <a:rPr lang="de-DE" smtClean="0"/>
-              <a:t>03.03.2017</a:t>
+              <a:t>05.03.2017</a:t>
             </a:fld>
             <a:endParaRPr lang="de-DE"/>
           </a:p>
@@ -2000,7 +2000,7 @@
           <a:p>
             <a:fld id="{62A7EEA7-7CF7-4A21-92C8-3CFB69AD4175}" type="datetimeFigureOut">
               <a:rPr lang="de-DE" smtClean="0"/>
-              <a:t>03.03.2017</a:t>
+              <a:t>05.03.2017</a:t>
             </a:fld>
             <a:endParaRPr lang="de-DE"/>
           </a:p>
@@ -2277,7 +2277,7 @@
           <a:p>
             <a:fld id="{62A7EEA7-7CF7-4A21-92C8-3CFB69AD4175}" type="datetimeFigureOut">
               <a:rPr lang="de-DE" smtClean="0"/>
-              <a:t>03.03.2017</a:t>
+              <a:t>05.03.2017</a:t>
             </a:fld>
             <a:endParaRPr lang="de-DE"/>
           </a:p>
@@ -2530,7 +2530,7 @@
           <a:p>
             <a:fld id="{62A7EEA7-7CF7-4A21-92C8-3CFB69AD4175}" type="datetimeFigureOut">
               <a:rPr lang="de-DE" smtClean="0"/>
-              <a:t>03.03.2017</a:t>
+              <a:t>05.03.2017</a:t>
             </a:fld>
             <a:endParaRPr lang="de-DE"/>
           </a:p>
@@ -2743,7 +2743,7 @@
           <a:p>
             <a:fld id="{62A7EEA7-7CF7-4A21-92C8-3CFB69AD4175}" type="datetimeFigureOut">
               <a:rPr lang="de-DE" smtClean="0"/>
-              <a:t>03.03.2017</a:t>
+              <a:t>05.03.2017</a:t>
             </a:fld>
             <a:endParaRPr lang="de-DE"/>
           </a:p>
@@ -10080,7 +10080,7 @@
         </p:nvGrpSpPr>
         <p:grpSpPr>
           <a:xfrm>
-            <a:off x="5284404" y="3023466"/>
+            <a:off x="467544" y="3023466"/>
             <a:ext cx="2952328" cy="172755"/>
             <a:chOff x="1221878" y="3117608"/>
             <a:chExt cx="2952328" cy="172755"/>
@@ -10559,7 +10559,7 @@
             <a:prstGeom prst="bentConnector2">
               <a:avLst/>
             </a:prstGeom>
-            <a:ln>
+            <a:ln w="19050">
               <a:solidFill>
                 <a:schemeClr val="tx1"/>
               </a:solidFill>
@@ -10597,7 +10597,7 @@
             <a:prstGeom prst="straightConnector1">
               <a:avLst/>
             </a:prstGeom>
-            <a:ln>
+            <a:ln w="19050">
               <a:solidFill>
                 <a:schemeClr val="tx1"/>
               </a:solidFill>
@@ -11177,7 +11177,7 @@
             <a:prstGeom prst="bentConnector2">
               <a:avLst/>
             </a:prstGeom>
-            <a:ln>
+            <a:ln w="19050">
               <a:solidFill>
                 <a:schemeClr val="tx1"/>
               </a:solidFill>
@@ -11215,7 +11215,7 @@
             <a:prstGeom prst="straightConnector1">
               <a:avLst/>
             </a:prstGeom>
-            <a:ln>
+            <a:ln w="19050">
               <a:solidFill>
                 <a:schemeClr val="tx1"/>
               </a:solidFill>
@@ -11809,7 +11809,7 @@
               <a:prstGeom prst="bentConnector2">
                 <a:avLst/>
               </a:prstGeom>
-              <a:ln>
+              <a:ln w="19050">
                 <a:solidFill>
                   <a:schemeClr val="tx1"/>
                 </a:solidFill>
@@ -11847,7 +11847,7 @@
               <a:prstGeom prst="straightConnector1">
                 <a:avLst/>
               </a:prstGeom>
-              <a:ln>
+              <a:ln w="19050">
                 <a:solidFill>
                   <a:schemeClr val="tx1"/>
                 </a:solidFill>
@@ -12178,45 +12178,6 @@
       </p:grpSp>
       <p:cxnSp>
         <p:nvCxnSpPr>
-          <p:cNvPr id="113" name="Gerade Verbindung mit Pfeil 11"/>
-          <p:cNvCxnSpPr/>
-          <p:nvPr/>
-        </p:nvCxnSpPr>
-        <p:spPr>
-          <a:xfrm rot="10800000" flipV="1">
-            <a:off x="6582519" y="991806"/>
-            <a:ext cx="1359535" cy="490329"/>
-          </a:xfrm>
-          <a:prstGeom prst="bentConnector3">
-            <a:avLst>
-              <a:gd name="adj1" fmla="val -78"/>
-            </a:avLst>
-          </a:prstGeom>
-          <a:ln>
-            <a:solidFill>
-              <a:schemeClr val="tx1"/>
-            </a:solidFill>
-            <a:prstDash val="dash"/>
-            <a:tailEnd type="triangle"/>
-          </a:ln>
-        </p:spPr>
-        <p:style>
-          <a:lnRef idx="1">
-            <a:schemeClr val="accent1"/>
-          </a:lnRef>
-          <a:fillRef idx="0">
-            <a:schemeClr val="accent1"/>
-          </a:fillRef>
-          <a:effectRef idx="0">
-            <a:schemeClr val="accent1"/>
-          </a:effectRef>
-          <a:fontRef idx="minor">
-            <a:schemeClr val="tx1"/>
-          </a:fontRef>
-        </p:style>
-      </p:cxnSp>
-      <p:cxnSp>
-        <p:nvCxnSpPr>
           <p:cNvPr id="127" name="Gerade Verbindung mit Pfeil 1039"/>
           <p:cNvCxnSpPr>
             <a:stCxn id="62" idx="2"/>
@@ -12232,9 +12193,9 @@
           <a:prstGeom prst="bentConnector2">
             <a:avLst/>
           </a:prstGeom>
-          <a:ln>
+          <a:ln w="19050">
             <a:solidFill>
-              <a:srgbClr val="00B0F0"/>
+              <a:schemeClr val="tx1"/>
             </a:solidFill>
             <a:prstDash val="lgDash"/>
             <a:headEnd type="triangle"/>
@@ -12275,10 +12236,11 @@
               <a:gd name="adj1" fmla="val 50000"/>
             </a:avLst>
           </a:prstGeom>
-          <a:ln>
+          <a:ln w="25400">
             <a:solidFill>
-              <a:srgbClr val="00B050"/>
+              <a:schemeClr val="tx1"/>
             </a:solidFill>
+            <a:prstDash val="sysDot"/>
             <a:tailEnd type="triangle"/>
           </a:ln>
         </p:spPr>
@@ -12300,15 +12262,12 @@
       <p:cxnSp>
         <p:nvCxnSpPr>
           <p:cNvPr id="142" name="Gerade Verbindung mit Pfeil 1039"/>
-          <p:cNvCxnSpPr>
-            <a:stCxn id="7" idx="0"/>
-            <a:endCxn id="83" idx="2"/>
-          </p:cNvCxnSpPr>
+          <p:cNvCxnSpPr/>
           <p:nvPr/>
         </p:nvCxnSpPr>
         <p:spPr>
           <a:xfrm rot="5400000" flipH="1" flipV="1">
-            <a:off x="4175765" y="1569607"/>
+            <a:off x="4175766" y="1569607"/>
             <a:ext cx="675075" cy="460956"/>
           </a:xfrm>
           <a:prstGeom prst="bentConnector3">
@@ -12316,10 +12275,11 @@
               <a:gd name="adj1" fmla="val 50000"/>
             </a:avLst>
           </a:prstGeom>
-          <a:ln>
+          <a:ln w="25400">
             <a:solidFill>
-              <a:srgbClr val="00B050"/>
+              <a:schemeClr val="tx1"/>
             </a:solidFill>
+            <a:prstDash val="sysDot"/>
             <a:tailEnd type="triangle"/>
           </a:ln>
         </p:spPr>
@@ -12355,9 +12315,9 @@
           <a:prstGeom prst="bentConnector2">
             <a:avLst/>
           </a:prstGeom>
-          <a:ln>
+          <a:ln w="19050">
             <a:solidFill>
-              <a:srgbClr val="00B0F0"/>
+              <a:schemeClr val="tx1"/>
             </a:solidFill>
             <a:prstDash val="lgDash"/>
             <a:headEnd type="triangle"/>
@@ -12395,9 +12355,9 @@
           <a:prstGeom prst="bentConnector2">
             <a:avLst/>
           </a:prstGeom>
-          <a:ln>
+          <a:ln w="19050">
             <a:solidFill>
-              <a:srgbClr val="00B0F0"/>
+              <a:schemeClr val="tx1"/>
             </a:solidFill>
             <a:prstDash val="lgDash"/>
             <a:headEnd type="triangle"/>
@@ -12438,10 +12398,11 @@
               <a:gd name="adj1" fmla="val 50000"/>
             </a:avLst>
           </a:prstGeom>
-          <a:ln>
+          <a:ln w="25400">
             <a:solidFill>
-              <a:srgbClr val="00B050"/>
+              <a:schemeClr val="tx1"/>
             </a:solidFill>
+            <a:prstDash val="sysDot"/>
             <a:headEnd type="triangle"/>
             <a:tailEnd type="triangle"/>
           </a:ln>
@@ -12469,10 +12430,10 @@
         </p:nvGrpSpPr>
         <p:grpSpPr>
           <a:xfrm>
-            <a:off x="6156176" y="1988840"/>
-            <a:ext cx="2808312" cy="790713"/>
-            <a:chOff x="683568" y="3470418"/>
-            <a:chExt cx="2808312" cy="790713"/>
+            <a:off x="6156176" y="2135548"/>
+            <a:ext cx="2987824" cy="1008112"/>
+            <a:chOff x="683568" y="3614434"/>
+            <a:chExt cx="2987824" cy="1008112"/>
           </a:xfrm>
         </p:grpSpPr>
         <p:cxnSp>
@@ -12483,15 +12444,15 @@
           </p:nvCxnSpPr>
           <p:spPr>
             <a:xfrm>
-              <a:off x="683568" y="4005064"/>
+              <a:off x="683568" y="4334514"/>
               <a:ext cx="475672" cy="0"/>
             </a:xfrm>
             <a:prstGeom prst="line">
               <a:avLst/>
             </a:prstGeom>
-            <a:ln>
+            <a:ln w="19050">
               <a:solidFill>
-                <a:srgbClr val="66CCFF"/>
+                <a:schemeClr val="tx1"/>
               </a:solidFill>
               <a:prstDash val="lgDash"/>
             </a:ln>
@@ -12519,13 +12480,13 @@
           </p:nvCxnSpPr>
           <p:spPr>
             <a:xfrm>
-              <a:off x="683568" y="3789040"/>
+              <a:off x="683568" y="4046482"/>
               <a:ext cx="475672" cy="0"/>
             </a:xfrm>
             <a:prstGeom prst="line">
               <a:avLst/>
             </a:prstGeom>
-            <a:ln>
+            <a:ln w="19050">
               <a:solidFill>
                 <a:schemeClr val="tx1"/>
               </a:solidFill>
@@ -12555,17 +12516,17 @@
           </p:nvCxnSpPr>
           <p:spPr>
             <a:xfrm>
-              <a:off x="683568" y="3573016"/>
+              <a:off x="683568" y="3614434"/>
               <a:ext cx="475672" cy="0"/>
             </a:xfrm>
             <a:prstGeom prst="line">
               <a:avLst/>
             </a:prstGeom>
-            <a:ln>
+            <a:ln w="25400">
               <a:solidFill>
-                <a:srgbClr val="00B050"/>
+                <a:schemeClr val="tx1"/>
               </a:solidFill>
-              <a:prstDash val="solid"/>
+              <a:prstDash val="sysDot"/>
             </a:ln>
           </p:spPr>
           <p:style>
@@ -12591,8 +12552,8 @@
           </p:nvSpPr>
           <p:spPr>
             <a:xfrm>
-              <a:off x="1128522" y="3470418"/>
-              <a:ext cx="995206" cy="174606"/>
+              <a:off x="1128522" y="3640747"/>
+              <a:ext cx="2542870" cy="117703"/>
             </a:xfrm>
             <a:prstGeom prst="rect">
               <a:avLst/>
@@ -12628,6 +12589,21 @@
                     <a:sysClr val="windowText" lastClr="000000"/>
                   </a:solidFill>
                 </a:rPr>
+                <a:t>Kommunikation über</a:t>
+              </a:r>
+              <a:br>
+                <a:rPr lang="de-DE" sz="1400" dirty="0" smtClean="0">
+                  <a:solidFill>
+                    <a:sysClr val="windowText" lastClr="000000"/>
+                  </a:solidFill>
+                </a:rPr>
+              </a:br>
+              <a:r>
+                <a:rPr lang="de-DE" sz="1400" dirty="0" smtClean="0">
+                  <a:solidFill>
+                    <a:sysClr val="windowText" lastClr="000000"/>
+                  </a:solidFill>
+                </a:rPr>
                 <a:t>BBB Client</a:t>
               </a:r>
               <a:endParaRPr lang="de-DE" sz="1400" dirty="0">
@@ -12646,7 +12622,7 @@
           </p:nvSpPr>
           <p:spPr>
             <a:xfrm>
-              <a:off x="1115616" y="3902466"/>
+              <a:off x="1118728" y="4263881"/>
               <a:ext cx="2376264" cy="358665"/>
             </a:xfrm>
             <a:prstGeom prst="rect">
@@ -12701,7 +12677,7 @@
           </p:nvSpPr>
           <p:spPr>
             <a:xfrm>
-              <a:off x="1115616" y="3679718"/>
+              <a:off x="1118728" y="3974474"/>
               <a:ext cx="1395735" cy="181330"/>
             </a:xfrm>
             <a:prstGeom prst="rect">
@@ -12733,12 +12709,12 @@
             <a:lstStyle/>
             <a:p>
               <a:r>
-                <a:rPr lang="de-DE" sz="1400" dirty="0" smtClean="0">
+                <a:rPr lang="de-DE" sz="1400" dirty="0" err="1" smtClean="0">
                   <a:solidFill>
                     <a:sysClr val="windowText" lastClr="000000"/>
                   </a:solidFill>
                 </a:rPr>
-                <a:t>Audio &amp; Video</a:t>
+                <a:t>Medienstreams</a:t>
               </a:r>
               <a:endParaRPr lang="de-DE" sz="1400" dirty="0">
                 <a:solidFill>
@@ -12752,24 +12728,22 @@
       <p:cxnSp>
         <p:nvCxnSpPr>
           <p:cNvPr id="109" name="Gerade Verbindung mit Pfeil 11"/>
-          <p:cNvCxnSpPr>
-            <a:stCxn id="4" idx="2"/>
-            <a:endCxn id="103" idx="3"/>
-          </p:cNvCxnSpPr>
+          <p:cNvCxnSpPr/>
           <p:nvPr/>
         </p:nvCxnSpPr>
         <p:spPr>
           <a:xfrm rot="5400000">
-            <a:off x="7560967" y="921033"/>
+            <a:off x="7560967" y="921035"/>
             <a:ext cx="310309" cy="451856"/>
           </a:xfrm>
           <a:prstGeom prst="bentConnector2">
             <a:avLst/>
           </a:prstGeom>
-          <a:ln>
+          <a:ln w="19050">
             <a:solidFill>
-              <a:srgbClr val="00B050"/>
+              <a:schemeClr val="tx1"/>
             </a:solidFill>
+            <a:headEnd type="triangle"/>
             <a:tailEnd type="triangle"/>
           </a:ln>
         </p:spPr>
@@ -13074,11 +13048,11 @@
         <p:spPr>
           <a:xfrm>
             <a:off x="3046495" y="745265"/>
-            <a:ext cx="1057862" cy="883534"/>
+            <a:ext cx="1021450" cy="883534"/>
           </a:xfrm>
           <a:prstGeom prst="bentConnector3">
             <a:avLst>
-              <a:gd name="adj1" fmla="val 100134"/>
+              <a:gd name="adj1" fmla="val 100131"/>
             </a:avLst>
           </a:prstGeom>
           <a:ln w="38100">
@@ -13121,11 +13095,11 @@
           <a:prstGeom prst="bentConnector2">
             <a:avLst/>
           </a:prstGeom>
-          <a:ln w="38100">
+          <a:ln w="25400">
             <a:solidFill>
               <a:srgbClr val="66CCFF"/>
             </a:solidFill>
-            <a:prstDash val="dash"/>
+            <a:prstDash val="solid"/>
             <a:headEnd type="triangle"/>
             <a:tailEnd type="triangle"/>
           </a:ln>
@@ -13514,11 +13488,11 @@
               <a:prstGeom prst="straightConnector1">
                 <a:avLst/>
               </a:prstGeom>
-              <a:ln w="38100">
+              <a:ln w="25400">
                 <a:solidFill>
                   <a:srgbClr val="66CCFF"/>
                 </a:solidFill>
-                <a:prstDash val="dash"/>
+                <a:prstDash val="solid"/>
                 <a:tailEnd type="none"/>
               </a:ln>
             </p:spPr>

</xml_diff>